<commit_message>
Updated lectures 08 and 09, added solutions to tutorial 08
</commit_message>
<xml_diff>
--- a/lectures/08_nlp_applications/08_nlp_applications.pptx
+++ b/lectures/08_nlp_applications/08_nlp_applications.pptx
@@ -31,18 +31,19 @@
     <p:sldId id="286" r:id="rId25"/>
     <p:sldId id="292" r:id="rId26"/>
     <p:sldId id="293" r:id="rId27"/>
-    <p:sldId id="297" r:id="rId28"/>
-    <p:sldId id="273" r:id="rId29"/>
-    <p:sldId id="260" r:id="rId30"/>
-    <p:sldId id="261" r:id="rId31"/>
-    <p:sldId id="264" r:id="rId32"/>
-    <p:sldId id="265" r:id="rId33"/>
-    <p:sldId id="267" r:id="rId34"/>
-    <p:sldId id="269" r:id="rId35"/>
-    <p:sldId id="270" r:id="rId36"/>
-    <p:sldId id="271" r:id="rId37"/>
-    <p:sldId id="298" r:id="rId38"/>
-    <p:sldId id="272" r:id="rId39"/>
+    <p:sldId id="299" r:id="rId28"/>
+    <p:sldId id="297" r:id="rId29"/>
+    <p:sldId id="273" r:id="rId30"/>
+    <p:sldId id="260" r:id="rId31"/>
+    <p:sldId id="261" r:id="rId32"/>
+    <p:sldId id="264" r:id="rId33"/>
+    <p:sldId id="265" r:id="rId34"/>
+    <p:sldId id="267" r:id="rId35"/>
+    <p:sldId id="269" r:id="rId36"/>
+    <p:sldId id="270" r:id="rId37"/>
+    <p:sldId id="271" r:id="rId38"/>
+    <p:sldId id="298" r:id="rId39"/>
+    <p:sldId id="272" r:id="rId40"/>
   </p:sldIdLst>
   <p:sldSz cx="9144000" cy="6858000" type="screen4x3"/>
   <p:notesSz cx="7559675" cy="10691813"/>
@@ -147,7 +148,7 @@
 <file path=ppt/revisionInfo.xml><?xml version="1.0" encoding="utf-8"?>
 <p1510:revInfo xmlns:a="http://schemas.openxmlformats.org/drawingml/2006/main" xmlns:r="http://schemas.openxmlformats.org/officeDocument/2006/relationships" xmlns:p1510="http://schemas.microsoft.com/office/powerpoint/2015/10/main">
   <p1510:revLst>
-    <p1510:client id="{5E1EE8FC-AAAD-CD95-3DFE-56F15A4746BC}" v="12" dt="2025-05-18T11:52:00.355"/>
+    <p1510:client id="{2331FC9F-7727-A8BB-CDE3-033D404B1E2B}" v="267" dt="2025-05-20T16:20:24.751"/>
   </p1510:revLst>
 </p1510:revInfo>
 </file>
@@ -28536,6 +28537,945 @@
         <p:cNvPr id="1" name="">
           <a:extLst>
             <a:ext uri="{FF2B5EF4-FFF2-40B4-BE49-F238E27FC236}">
+              <a16:creationId xmlns:a16="http://schemas.microsoft.com/office/drawing/2014/main" id="{35B1A77C-CA8C-9E19-B56A-0D0684F57044}"/>
+            </a:ext>
+          </a:extLst>
+        </p:cNvPr>
+        <p:cNvGrpSpPr/>
+        <p:nvPr/>
+      </p:nvGrpSpPr>
+      <p:grpSpPr>
+        <a:xfrm>
+          <a:off x="0" y="0"/>
+          <a:ext cx="0" cy="0"/>
+          <a:chOff x="0" y="0"/>
+          <a:chExt cx="0" cy="0"/>
+        </a:xfrm>
+      </p:grpSpPr>
+      <p:sp>
+        <p:nvSpPr>
+          <p:cNvPr id="88" name="PlaceHolder 1">
+            <a:extLst>
+              <a:ext uri="{FF2B5EF4-FFF2-40B4-BE49-F238E27FC236}">
+                <a16:creationId xmlns:a16="http://schemas.microsoft.com/office/drawing/2014/main" id="{3E0ECD89-A9BE-0FE3-4723-A3CBDCD58FF8}"/>
+              </a:ext>
+            </a:extLst>
+          </p:cNvPr>
+          <p:cNvSpPr>
+            <a:spLocks noGrp="1"/>
+          </p:cNvSpPr>
+          <p:nvPr>
+            <p:ph type="title"/>
+          </p:nvPr>
+        </p:nvSpPr>
+        <p:spPr>
+          <a:xfrm>
+            <a:off x="684000" y="584640"/>
+            <a:ext cx="6721436" cy="576970"/>
+          </a:xfrm>
+          <a:prstGeom prst="rect">
+            <a:avLst/>
+          </a:prstGeom>
+          <a:noFill/>
+          <a:ln w="0">
+            <a:noFill/>
+          </a:ln>
+        </p:spPr>
+        <p:txBody>
+          <a:bodyPr lIns="0" tIns="0" rIns="0" bIns="0" anchor="t">
+            <a:noAutofit/>
+          </a:bodyPr>
+          <a:lstStyle/>
+          <a:p>
+            <a:pPr>
+              <a:lnSpc>
+                <a:spcPct val="100000"/>
+              </a:lnSpc>
+            </a:pPr>
+            <a:r>
+              <a:rPr lang="de-DE" sz="3000" b="1" spc="-1" dirty="0">
+                <a:solidFill>
+                  <a:srgbClr val="003056"/>
+                </a:solidFill>
+                <a:latin typeface="Calibri"/>
+                <a:ea typeface="+mj-lt"/>
+                <a:cs typeface="+mj-lt"/>
+              </a:rPr>
+              <a:t>PLMs </a:t>
+            </a:r>
+            <a:r>
+              <a:rPr lang="de-DE" sz="3000" b="1" spc="-1" dirty="0" err="1">
+                <a:solidFill>
+                  <a:srgbClr val="003056"/>
+                </a:solidFill>
+                <a:latin typeface="Calibri"/>
+                <a:ea typeface="+mj-lt"/>
+                <a:cs typeface="+mj-lt"/>
+              </a:rPr>
+              <a:t>vs</a:t>
+            </a:r>
+            <a:r>
+              <a:rPr lang="de-DE" sz="3000" b="1" spc="-1" dirty="0">
+                <a:solidFill>
+                  <a:srgbClr val="003056"/>
+                </a:solidFill>
+                <a:latin typeface="Calibri"/>
+                <a:ea typeface="+mj-lt"/>
+                <a:cs typeface="+mj-lt"/>
+              </a:rPr>
+              <a:t> LLMs</a:t>
+            </a:r>
+            <a:endParaRPr lang="en-US" dirty="0"/>
+          </a:p>
+        </p:txBody>
+      </p:sp>
+      <p:sp>
+        <p:nvSpPr>
+          <p:cNvPr id="89" name="PlaceHolder 2">
+            <a:extLst>
+              <a:ext uri="{FF2B5EF4-FFF2-40B4-BE49-F238E27FC236}">
+                <a16:creationId xmlns:a16="http://schemas.microsoft.com/office/drawing/2014/main" id="{38952E03-9E16-6E55-37E5-5ED79D2189DA}"/>
+              </a:ext>
+            </a:extLst>
+          </p:cNvPr>
+          <p:cNvSpPr>
+            <a:spLocks noGrp="1"/>
+          </p:cNvSpPr>
+          <p:nvPr>
+            <p:ph type="ftr" idx="8"/>
+          </p:nvPr>
+        </p:nvSpPr>
+        <p:spPr>
+          <a:xfrm>
+            <a:off x="684000" y="6134400"/>
+            <a:ext cx="2895120" cy="179640"/>
+          </a:xfrm>
+          <a:prstGeom prst="rect">
+            <a:avLst/>
+          </a:prstGeom>
+          <a:noFill/>
+          <a:ln w="0">
+            <a:noFill/>
+          </a:ln>
+        </p:spPr>
+        <p:txBody>
+          <a:bodyPr lIns="0" tIns="0" rIns="0" bIns="0" anchor="t">
+            <a:noAutofit/>
+          </a:bodyPr>
+          <a:lstStyle>
+            <a:lvl1pPr>
+              <a:lnSpc>
+                <a:spcPct val="100000"/>
+              </a:lnSpc>
+              <a:buNone/>
+              <a:defRPr lang="de-DE" sz="1200" b="0" strike="noStrike" spc="-1">
+                <a:solidFill>
+                  <a:srgbClr val="003056"/>
+                </a:solidFill>
+                <a:latin typeface="Calibri"/>
+              </a:defRPr>
+            </a:lvl1pPr>
+          </a:lstStyle>
+          <a:p>
+            <a:pPr>
+              <a:lnSpc>
+                <a:spcPct val="100000"/>
+              </a:lnSpc>
+              <a:buNone/>
+            </a:pPr>
+            <a:r>
+              <a:rPr lang="de-DE" sz="1200" b="0" strike="noStrike" spc="-1">
+                <a:solidFill>
+                  <a:srgbClr val="003056"/>
+                </a:solidFill>
+                <a:latin typeface="Calibri"/>
+              </a:rPr>
+              <a:t>Dr. Daniel Ruffinelli - FSS 2025</a:t>
+            </a:r>
+            <a:endParaRPr lang="en-US" sz="1200" b="0" strike="noStrike" spc="-1">
+              <a:latin typeface="Times New Roman"/>
+            </a:endParaRPr>
+          </a:p>
+        </p:txBody>
+      </p:sp>
+      <p:sp>
+        <p:nvSpPr>
+          <p:cNvPr id="90" name="PlaceHolder 3">
+            <a:extLst>
+              <a:ext uri="{FF2B5EF4-FFF2-40B4-BE49-F238E27FC236}">
+                <a16:creationId xmlns:a16="http://schemas.microsoft.com/office/drawing/2014/main" id="{125DF863-8D36-7603-BA74-EBDE4A02187B}"/>
+              </a:ext>
+            </a:extLst>
+          </p:cNvPr>
+          <p:cNvSpPr>
+            <a:spLocks noGrp="1"/>
+          </p:cNvSpPr>
+          <p:nvPr>
+            <p:ph/>
+          </p:nvPr>
+        </p:nvSpPr>
+        <p:spPr>
+          <a:xfrm>
+            <a:off x="684000" y="1143000"/>
+            <a:ext cx="7775640" cy="4986180"/>
+          </a:xfrm>
+          <a:prstGeom prst="rect">
+            <a:avLst/>
+          </a:prstGeom>
+          <a:noFill/>
+          <a:ln w="0">
+            <a:noFill/>
+          </a:ln>
+        </p:spPr>
+        <p:txBody>
+          <a:bodyPr lIns="0" tIns="0" rIns="0" bIns="0" anchor="t">
+            <a:noAutofit/>
+          </a:bodyPr>
+          <a:lstStyle/>
+          <a:p>
+            <a:pPr marL="342900" indent="-342900">
+              <a:lnSpc>
+                <a:spcPct val="100000"/>
+              </a:lnSpc>
+              <a:spcBef>
+                <a:spcPts val="400"/>
+              </a:spcBef>
+              <a:buClr>
+                <a:srgbClr val="003056"/>
+              </a:buClr>
+              <a:buFont typeface="Arial"/>
+              <a:buChar char="•"/>
+            </a:pPr>
+            <a:r>
+              <a:rPr lang="en-US" sz="2000" spc="-1" dirty="0">
+                <a:solidFill>
+                  <a:srgbClr val="003056"/>
+                </a:solidFill>
+                <a:latin typeface="Calibri"/>
+              </a:rPr>
+              <a:t>Fair question: </a:t>
+            </a:r>
+            <a:r>
+              <a:rPr lang="en-US" sz="2000" b="1" spc="-1" dirty="0">
+                <a:solidFill>
+                  <a:srgbClr val="003056"/>
+                </a:solidFill>
+                <a:latin typeface="Calibri"/>
+              </a:rPr>
+              <a:t>why </a:t>
+            </a:r>
+            <a:r>
+              <a:rPr lang="en-US" sz="2000" spc="-1" dirty="0">
+                <a:solidFill>
+                  <a:srgbClr val="003056"/>
+                </a:solidFill>
+                <a:latin typeface="Calibri"/>
+              </a:rPr>
+              <a:t>use</a:t>
+            </a:r>
+            <a:r>
+              <a:rPr lang="en-US" sz="2000" b="1" spc="-1" dirty="0">
+                <a:solidFill>
+                  <a:srgbClr val="003056"/>
+                </a:solidFill>
+                <a:latin typeface="Calibri"/>
+              </a:rPr>
+              <a:t> CLM (seq2seq) for</a:t>
+            </a:r>
+            <a:r>
+              <a:rPr lang="en-US" sz="2000" spc="-1" dirty="0">
+                <a:solidFill>
+                  <a:srgbClr val="003056"/>
+                </a:solidFill>
+                <a:latin typeface="Calibri"/>
+              </a:rPr>
+              <a:t> (discrete)</a:t>
+            </a:r>
+            <a:r>
+              <a:rPr lang="en-US" sz="2000" b="1" spc="-1" dirty="0">
+                <a:solidFill>
+                  <a:srgbClr val="003056"/>
+                </a:solidFill>
+                <a:latin typeface="Calibri"/>
+              </a:rPr>
+              <a:t> classification tasks?</a:t>
+            </a:r>
+            <a:endParaRPr lang="en-US" b="1" dirty="0">
+              <a:solidFill>
+                <a:srgbClr val="000000"/>
+              </a:solidFill>
+              <a:latin typeface="Arial"/>
+            </a:endParaRPr>
+          </a:p>
+          <a:p>
+            <a:pPr marL="800100" lvl="1" indent="-342900">
+              <a:lnSpc>
+                <a:spcPct val="100000"/>
+              </a:lnSpc>
+              <a:spcBef>
+                <a:spcPts val="400"/>
+              </a:spcBef>
+              <a:buClr>
+                <a:srgbClr val="003056"/>
+              </a:buClr>
+              <a:buFont typeface="Arial"/>
+              <a:buChar char="•"/>
+            </a:pPr>
+            <a:r>
+              <a:rPr lang="en-US" sz="1800" spc="-1" dirty="0">
+                <a:solidFill>
+                  <a:srgbClr val="003056"/>
+                </a:solidFill>
+                <a:latin typeface="Calibri"/>
+              </a:rPr>
+              <a:t>Why not something more designed for that, e.g. a MLM?</a:t>
+            </a:r>
+          </a:p>
+          <a:p>
+            <a:pPr marL="342900" indent="-342900">
+              <a:lnSpc>
+                <a:spcPct val="100000"/>
+              </a:lnSpc>
+              <a:spcBef>
+                <a:spcPts val="400"/>
+              </a:spcBef>
+              <a:buClr>
+                <a:srgbClr val="003056"/>
+              </a:buClr>
+              <a:buFont typeface="Arial"/>
+              <a:buChar char="•"/>
+            </a:pPr>
+            <a:r>
+              <a:rPr lang="en-US" sz="2000" spc="-1" dirty="0">
+                <a:solidFill>
+                  <a:srgbClr val="003056"/>
+                </a:solidFill>
+                <a:latin typeface="Calibri"/>
+                <a:hlinkClick r:id="rId2"/>
+              </a:rPr>
+              <a:t>Ahuja et al. (2023)</a:t>
+            </a:r>
+            <a:r>
+              <a:rPr lang="en-US" sz="2000" spc="-1" dirty="0">
+                <a:solidFill>
+                  <a:srgbClr val="003056"/>
+                </a:solidFill>
+                <a:latin typeface="Calibri"/>
+              </a:rPr>
+              <a:t> report fine-tuned PLMs better than LLMs</a:t>
+            </a:r>
+          </a:p>
+          <a:p>
+            <a:pPr marL="800100" lvl="1" indent="-342900">
+              <a:lnSpc>
+                <a:spcPct val="100000"/>
+              </a:lnSpc>
+              <a:spcBef>
+                <a:spcPts val="400"/>
+              </a:spcBef>
+              <a:buClr>
+                <a:srgbClr val="003056"/>
+              </a:buClr>
+              <a:buFont typeface="Arial"/>
+              <a:buChar char="•"/>
+            </a:pPr>
+            <a:r>
+              <a:rPr lang="en-US" sz="1800" spc="-1" dirty="0">
+                <a:solidFill>
+                  <a:srgbClr val="003056"/>
+                </a:solidFill>
+                <a:latin typeface="Calibri"/>
+              </a:rPr>
+              <a:t>Columns: tasks, underlined results: best overall, PLMs almost always better</a:t>
+            </a:r>
+          </a:p>
+          <a:p>
+            <a:pPr marL="800100" lvl="1" indent="-342900">
+              <a:lnSpc>
+                <a:spcPct val="100000"/>
+              </a:lnSpc>
+              <a:spcBef>
+                <a:spcPts val="400"/>
+              </a:spcBef>
+              <a:buClr>
+                <a:srgbClr val="003056"/>
+              </a:buClr>
+              <a:buFont typeface="Arial"/>
+              <a:buChar char="•"/>
+            </a:pPr>
+            <a:endParaRPr lang="en-US" sz="1800" spc="-1" dirty="0">
+              <a:solidFill>
+                <a:srgbClr val="003056"/>
+              </a:solidFill>
+              <a:latin typeface="Calibri"/>
+            </a:endParaRPr>
+          </a:p>
+          <a:p>
+            <a:pPr marL="800100" lvl="1" indent="-342900">
+              <a:lnSpc>
+                <a:spcPct val="100000"/>
+              </a:lnSpc>
+              <a:spcBef>
+                <a:spcPts val="400"/>
+              </a:spcBef>
+              <a:buClr>
+                <a:srgbClr val="003056"/>
+              </a:buClr>
+              <a:buFont typeface="Arial"/>
+              <a:buChar char="•"/>
+            </a:pPr>
+            <a:endParaRPr lang="en-US" sz="1800" spc="-1" dirty="0">
+              <a:solidFill>
+                <a:srgbClr val="003056"/>
+              </a:solidFill>
+              <a:latin typeface="Calibri"/>
+            </a:endParaRPr>
+          </a:p>
+          <a:p>
+            <a:pPr marL="800100" lvl="1" indent="-342900">
+              <a:lnSpc>
+                <a:spcPct val="100000"/>
+              </a:lnSpc>
+              <a:spcBef>
+                <a:spcPts val="400"/>
+              </a:spcBef>
+              <a:buClr>
+                <a:srgbClr val="003056"/>
+              </a:buClr>
+              <a:buFont typeface="Arial"/>
+              <a:buChar char="•"/>
+            </a:pPr>
+            <a:endParaRPr lang="en-US" sz="1800" spc="-1" dirty="0">
+              <a:solidFill>
+                <a:srgbClr val="003056"/>
+              </a:solidFill>
+              <a:latin typeface="Calibri"/>
+            </a:endParaRPr>
+          </a:p>
+          <a:p>
+            <a:pPr marL="800100" lvl="1" indent="-342900">
+              <a:lnSpc>
+                <a:spcPct val="100000"/>
+              </a:lnSpc>
+              <a:spcBef>
+                <a:spcPts val="400"/>
+              </a:spcBef>
+              <a:buClr>
+                <a:srgbClr val="003056"/>
+              </a:buClr>
+              <a:buFont typeface="Arial"/>
+              <a:buChar char="•"/>
+            </a:pPr>
+            <a:endParaRPr lang="en-US" sz="1800" spc="-1" dirty="0">
+              <a:solidFill>
+                <a:srgbClr val="003056"/>
+              </a:solidFill>
+              <a:latin typeface="Calibri"/>
+            </a:endParaRPr>
+          </a:p>
+          <a:p>
+            <a:pPr marL="800100" lvl="1" indent="-342900">
+              <a:lnSpc>
+                <a:spcPct val="100000"/>
+              </a:lnSpc>
+              <a:spcBef>
+                <a:spcPts val="400"/>
+              </a:spcBef>
+              <a:buClr>
+                <a:srgbClr val="003056"/>
+              </a:buClr>
+              <a:buFont typeface="Arial"/>
+              <a:buChar char="•"/>
+            </a:pPr>
+            <a:endParaRPr lang="en-US" sz="1800" spc="-1" dirty="0">
+              <a:solidFill>
+                <a:srgbClr val="003056"/>
+              </a:solidFill>
+              <a:latin typeface="Calibri"/>
+            </a:endParaRPr>
+          </a:p>
+          <a:p>
+            <a:pPr marL="800100" lvl="1" indent="-342900">
+              <a:lnSpc>
+                <a:spcPct val="100000"/>
+              </a:lnSpc>
+              <a:spcBef>
+                <a:spcPts val="400"/>
+              </a:spcBef>
+              <a:buClr>
+                <a:srgbClr val="003056"/>
+              </a:buClr>
+              <a:buFont typeface="Arial"/>
+              <a:buChar char="•"/>
+            </a:pPr>
+            <a:endParaRPr lang="en-US" sz="1800" spc="-1" dirty="0">
+              <a:solidFill>
+                <a:srgbClr val="003056"/>
+              </a:solidFill>
+              <a:latin typeface="Calibri"/>
+            </a:endParaRPr>
+          </a:p>
+          <a:p>
+            <a:pPr marL="800100" lvl="1" indent="-342900">
+              <a:lnSpc>
+                <a:spcPct val="100000"/>
+              </a:lnSpc>
+              <a:spcBef>
+                <a:spcPts val="400"/>
+              </a:spcBef>
+              <a:buClr>
+                <a:srgbClr val="003056"/>
+              </a:buClr>
+              <a:buFont typeface="Arial"/>
+              <a:buChar char="•"/>
+            </a:pPr>
+            <a:endParaRPr lang="en-US" sz="1800" spc="-1" dirty="0">
+              <a:solidFill>
+                <a:srgbClr val="003056"/>
+              </a:solidFill>
+              <a:latin typeface="Calibri"/>
+            </a:endParaRPr>
+          </a:p>
+          <a:p>
+            <a:pPr marL="800100" lvl="1" indent="-342900">
+              <a:lnSpc>
+                <a:spcPct val="100000"/>
+              </a:lnSpc>
+              <a:spcBef>
+                <a:spcPts val="400"/>
+              </a:spcBef>
+              <a:buClr>
+                <a:srgbClr val="003056"/>
+              </a:buClr>
+              <a:buFont typeface="Arial"/>
+              <a:buChar char="•"/>
+            </a:pPr>
+            <a:endParaRPr lang="en-US" sz="1800" spc="-1" dirty="0">
+              <a:solidFill>
+                <a:srgbClr val="003056"/>
+              </a:solidFill>
+              <a:latin typeface="Calibri"/>
+            </a:endParaRPr>
+          </a:p>
+          <a:p>
+            <a:pPr marL="800100" lvl="1" indent="-342900">
+              <a:lnSpc>
+                <a:spcPct val="100000"/>
+              </a:lnSpc>
+              <a:spcBef>
+                <a:spcPts val="400"/>
+              </a:spcBef>
+              <a:buClr>
+                <a:srgbClr val="003056"/>
+              </a:buClr>
+              <a:buFont typeface="Arial"/>
+              <a:buChar char="•"/>
+            </a:pPr>
+            <a:endParaRPr lang="en-US" sz="1800" spc="-1" dirty="0">
+              <a:solidFill>
+                <a:srgbClr val="003056"/>
+              </a:solidFill>
+              <a:latin typeface="Calibri"/>
+            </a:endParaRPr>
+          </a:p>
+          <a:p>
+            <a:pPr marL="800100" lvl="1" indent="-342900">
+              <a:lnSpc>
+                <a:spcPct val="100000"/>
+              </a:lnSpc>
+              <a:spcBef>
+                <a:spcPts val="400"/>
+              </a:spcBef>
+              <a:buClr>
+                <a:srgbClr val="003056"/>
+              </a:buClr>
+              <a:buFont typeface="Arial"/>
+              <a:buChar char="•"/>
+            </a:pPr>
+            <a:endParaRPr lang="en-US" sz="1800" spc="-1" dirty="0">
+              <a:solidFill>
+                <a:srgbClr val="003056"/>
+              </a:solidFill>
+              <a:latin typeface="Calibri"/>
+            </a:endParaRPr>
+          </a:p>
+          <a:p>
+            <a:pPr marL="342900" indent="-342900">
+              <a:lnSpc>
+                <a:spcPct val="100000"/>
+              </a:lnSpc>
+              <a:spcBef>
+                <a:spcPts val="400"/>
+              </a:spcBef>
+              <a:buClr>
+                <a:srgbClr val="003056"/>
+              </a:buClr>
+              <a:buFont typeface="Arial"/>
+              <a:buChar char="•"/>
+            </a:pPr>
+            <a:r>
+              <a:rPr lang="en-US" sz="2000" spc="-1" dirty="0">
+                <a:solidFill>
+                  <a:srgbClr val="003056"/>
+                </a:solidFill>
+                <a:latin typeface="Calibri"/>
+              </a:rPr>
+              <a:t>Gap may have decreased since then, but question still fair</a:t>
+            </a:r>
+          </a:p>
+        </p:txBody>
+      </p:sp>
+      <p:sp>
+        <p:nvSpPr>
+          <p:cNvPr id="5" name="PlaceHolder 4">
+            <a:extLst>
+              <a:ext uri="{FF2B5EF4-FFF2-40B4-BE49-F238E27FC236}">
+                <a16:creationId xmlns:a16="http://schemas.microsoft.com/office/drawing/2014/main" id="{06D2F5E9-9DEA-C4B9-8C8B-64BB57024E1B}"/>
+              </a:ext>
+            </a:extLst>
+          </p:cNvPr>
+          <p:cNvSpPr>
+            <a:spLocks noGrp="1"/>
+          </p:cNvSpPr>
+          <p:nvPr>
+            <p:ph type="sldNum" idx="6"/>
+          </p:nvPr>
+        </p:nvSpPr>
+        <p:spPr/>
+        <p:txBody>
+          <a:bodyPr/>
+          <a:lstStyle/>
+          <a:p>
+            <a:fld id="{70068E8A-AB75-4D96-80F4-5032AB30E87C}" type="slidenum">
+              <a:t>26</a:t>
+            </a:fld>
+            <a:endParaRPr/>
+          </a:p>
+        </p:txBody>
+      </p:sp>
+      <p:pic>
+        <p:nvPicPr>
+          <p:cNvPr id="2" name="Picture 1" descr="A table with numbers and symbols&#10;&#10;AI-generated content may be incorrect.">
+            <a:extLst>
+              <a:ext uri="{FF2B5EF4-FFF2-40B4-BE49-F238E27FC236}">
+                <a16:creationId xmlns:a16="http://schemas.microsoft.com/office/drawing/2014/main" id="{55DC6C68-9B4A-B391-A206-ADC7A80F722C}"/>
+              </a:ext>
+            </a:extLst>
+          </p:cNvPr>
+          <p:cNvPicPr>
+            <a:picLocks noChangeAspect="1"/>
+          </p:cNvPicPr>
+          <p:nvPr/>
+        </p:nvPicPr>
+        <p:blipFill>
+          <a:blip r:embed="rId3"/>
+          <a:stretch>
+            <a:fillRect/>
+          </a:stretch>
+        </p:blipFill>
+        <p:spPr>
+          <a:xfrm>
+            <a:off x="596713" y="2508299"/>
+            <a:ext cx="7958978" cy="3018021"/>
+          </a:xfrm>
+          <a:prstGeom prst="rect">
+            <a:avLst/>
+          </a:prstGeom>
+        </p:spPr>
+      </p:pic>
+    </p:spTree>
+    <p:extLst>
+      <p:ext uri="{BB962C8B-B14F-4D97-AF65-F5344CB8AC3E}">
+        <p14:creationId xmlns:p14="http://schemas.microsoft.com/office/powerpoint/2010/main" val="278465315"/>
+      </p:ext>
+    </p:extLst>
+  </p:cSld>
+  <p:clrMapOvr>
+    <a:masterClrMapping/>
+  </p:clrMapOvr>
+  <p:transition>
+    <p:fade/>
+  </p:transition>
+  <p:timing>
+    <p:tnLst>
+      <p:par>
+        <p:cTn id="1" dur="indefinite" restart="never" nodeType="tmRoot">
+          <p:childTnLst>
+            <p:seq concurrent="1" nextAc="seek">
+              <p:cTn id="2" dur="indefinite" nodeType="mainSeq">
+                <p:childTnLst>
+                  <p:par>
+                    <p:cTn id="3" fill="hold">
+                      <p:stCondLst>
+                        <p:cond delay="indefinite"/>
+                      </p:stCondLst>
+                      <p:childTnLst>
+                        <p:par>
+                          <p:cTn id="4" fill="hold">
+                            <p:stCondLst>
+                              <p:cond delay="0"/>
+                            </p:stCondLst>
+                            <p:childTnLst>
+                              <p:par>
+                                <p:cTn id="5" presetID="1" presetClass="entr" presetSubtype="0" fill="hold" grpId="0" nodeType="clickEffect">
+                                  <p:stCondLst>
+                                    <p:cond delay="0"/>
+                                  </p:stCondLst>
+                                  <p:childTnLst>
+                                    <p:set>
+                                      <p:cBhvr>
+                                        <p:cTn id="6" dur="1" fill="hold">
+                                          <p:stCondLst>
+                                            <p:cond delay="0"/>
+                                          </p:stCondLst>
+                                        </p:cTn>
+                                        <p:tgtEl>
+                                          <p:spTgt spid="90">
+                                            <p:txEl>
+                                              <p:pRg st="0" end="0"/>
+                                            </p:txEl>
+                                          </p:spTgt>
+                                        </p:tgtEl>
+                                        <p:attrNameLst>
+                                          <p:attrName>style.visibility</p:attrName>
+                                        </p:attrNameLst>
+                                      </p:cBhvr>
+                                      <p:to>
+                                        <p:strVal val="visible"/>
+                                      </p:to>
+                                    </p:set>
+                                  </p:childTnLst>
+                                </p:cTn>
+                              </p:par>
+                              <p:par>
+                                <p:cTn id="7" presetID="1" presetClass="entr" presetSubtype="0" fill="hold" grpId="0" nodeType="withEffect">
+                                  <p:stCondLst>
+                                    <p:cond delay="0"/>
+                                  </p:stCondLst>
+                                  <p:childTnLst>
+                                    <p:set>
+                                      <p:cBhvr>
+                                        <p:cTn id="8" dur="1" fill="hold">
+                                          <p:stCondLst>
+                                            <p:cond delay="0"/>
+                                          </p:stCondLst>
+                                        </p:cTn>
+                                        <p:tgtEl>
+                                          <p:spTgt spid="90">
+                                            <p:txEl>
+                                              <p:pRg st="1" end="1"/>
+                                            </p:txEl>
+                                          </p:spTgt>
+                                        </p:tgtEl>
+                                        <p:attrNameLst>
+                                          <p:attrName>style.visibility</p:attrName>
+                                        </p:attrNameLst>
+                                      </p:cBhvr>
+                                      <p:to>
+                                        <p:strVal val="visible"/>
+                                      </p:to>
+                                    </p:set>
+                                  </p:childTnLst>
+                                </p:cTn>
+                              </p:par>
+                            </p:childTnLst>
+                          </p:cTn>
+                        </p:par>
+                      </p:childTnLst>
+                    </p:cTn>
+                  </p:par>
+                  <p:par>
+                    <p:cTn id="9" fill="hold">
+                      <p:stCondLst>
+                        <p:cond delay="indefinite"/>
+                      </p:stCondLst>
+                      <p:childTnLst>
+                        <p:par>
+                          <p:cTn id="10" fill="hold">
+                            <p:stCondLst>
+                              <p:cond delay="0"/>
+                            </p:stCondLst>
+                            <p:childTnLst>
+                              <p:par>
+                                <p:cTn id="11" presetID="1" presetClass="entr" presetSubtype="0" fill="hold" grpId="0" nodeType="clickEffect">
+                                  <p:stCondLst>
+                                    <p:cond delay="0"/>
+                                  </p:stCondLst>
+                                  <p:childTnLst>
+                                    <p:set>
+                                      <p:cBhvr>
+                                        <p:cTn id="12" dur="1" fill="hold">
+                                          <p:stCondLst>
+                                            <p:cond delay="0"/>
+                                          </p:stCondLst>
+                                        </p:cTn>
+                                        <p:tgtEl>
+                                          <p:spTgt spid="90">
+                                            <p:txEl>
+                                              <p:pRg st="2" end="2"/>
+                                            </p:txEl>
+                                          </p:spTgt>
+                                        </p:tgtEl>
+                                        <p:attrNameLst>
+                                          <p:attrName>style.visibility</p:attrName>
+                                        </p:attrNameLst>
+                                      </p:cBhvr>
+                                      <p:to>
+                                        <p:strVal val="visible"/>
+                                      </p:to>
+                                    </p:set>
+                                  </p:childTnLst>
+                                </p:cTn>
+                              </p:par>
+                              <p:par>
+                                <p:cTn id="13" presetID="1" presetClass="entr" presetSubtype="0" fill="hold" grpId="0" nodeType="withEffect">
+                                  <p:stCondLst>
+                                    <p:cond delay="0"/>
+                                  </p:stCondLst>
+                                  <p:childTnLst>
+                                    <p:set>
+                                      <p:cBhvr>
+                                        <p:cTn id="14" dur="1" fill="hold">
+                                          <p:stCondLst>
+                                            <p:cond delay="0"/>
+                                          </p:stCondLst>
+                                        </p:cTn>
+                                        <p:tgtEl>
+                                          <p:spTgt spid="90">
+                                            <p:txEl>
+                                              <p:pRg st="3" end="3"/>
+                                            </p:txEl>
+                                          </p:spTgt>
+                                        </p:tgtEl>
+                                        <p:attrNameLst>
+                                          <p:attrName>style.visibility</p:attrName>
+                                        </p:attrNameLst>
+                                      </p:cBhvr>
+                                      <p:to>
+                                        <p:strVal val="visible"/>
+                                      </p:to>
+                                    </p:set>
+                                  </p:childTnLst>
+                                </p:cTn>
+                              </p:par>
+                              <p:par>
+                                <p:cTn id="15" presetID="1" presetClass="entr" presetSubtype="0" fill="hold" nodeType="withEffect">
+                                  <p:stCondLst>
+                                    <p:cond delay="0"/>
+                                  </p:stCondLst>
+                                  <p:childTnLst>
+                                    <p:set>
+                                      <p:cBhvr>
+                                        <p:cTn id="16" dur="1" fill="hold">
+                                          <p:stCondLst>
+                                            <p:cond delay="0"/>
+                                          </p:stCondLst>
+                                        </p:cTn>
+                                        <p:tgtEl>
+                                          <p:spTgt spid="2"/>
+                                        </p:tgtEl>
+                                        <p:attrNameLst>
+                                          <p:attrName>style.visibility</p:attrName>
+                                        </p:attrNameLst>
+                                      </p:cBhvr>
+                                      <p:to>
+                                        <p:strVal val="visible"/>
+                                      </p:to>
+                                    </p:set>
+                                  </p:childTnLst>
+                                </p:cTn>
+                              </p:par>
+                            </p:childTnLst>
+                          </p:cTn>
+                        </p:par>
+                      </p:childTnLst>
+                    </p:cTn>
+                  </p:par>
+                  <p:par>
+                    <p:cTn id="17" fill="hold">
+                      <p:stCondLst>
+                        <p:cond delay="indefinite"/>
+                      </p:stCondLst>
+                      <p:childTnLst>
+                        <p:par>
+                          <p:cTn id="18" fill="hold">
+                            <p:stCondLst>
+                              <p:cond delay="0"/>
+                            </p:stCondLst>
+                            <p:childTnLst>
+                              <p:par>
+                                <p:cTn id="19" presetID="1" presetClass="entr" presetSubtype="0" fill="hold" grpId="0" nodeType="clickEffect">
+                                  <p:stCondLst>
+                                    <p:cond delay="0"/>
+                                  </p:stCondLst>
+                                  <p:childTnLst>
+                                    <p:set>
+                                      <p:cBhvr>
+                                        <p:cTn id="20" dur="1" fill="hold">
+                                          <p:stCondLst>
+                                            <p:cond delay="0"/>
+                                          </p:stCondLst>
+                                        </p:cTn>
+                                        <p:tgtEl>
+                                          <p:spTgt spid="90">
+                                            <p:txEl>
+                                              <p:pRg st="14" end="14"/>
+                                            </p:txEl>
+                                          </p:spTgt>
+                                        </p:tgtEl>
+                                        <p:attrNameLst>
+                                          <p:attrName>style.visibility</p:attrName>
+                                        </p:attrNameLst>
+                                      </p:cBhvr>
+                                      <p:to>
+                                        <p:strVal val="visible"/>
+                                      </p:to>
+                                    </p:set>
+                                  </p:childTnLst>
+                                </p:cTn>
+                              </p:par>
+                            </p:childTnLst>
+                          </p:cTn>
+                        </p:par>
+                      </p:childTnLst>
+                    </p:cTn>
+                  </p:par>
+                </p:childTnLst>
+              </p:cTn>
+              <p:prevCondLst>
+                <p:cond evt="onPrev" delay="0">
+                  <p:tgtEl>
+                    <p:sldTgt/>
+                  </p:tgtEl>
+                </p:cond>
+              </p:prevCondLst>
+              <p:nextCondLst>
+                <p:cond evt="onNext" delay="0">
+                  <p:tgtEl>
+                    <p:sldTgt/>
+                  </p:tgtEl>
+                </p:cond>
+              </p:nextCondLst>
+            </p:seq>
+          </p:childTnLst>
+        </p:cTn>
+      </p:par>
+    </p:tnLst>
+    <p:bldLst>
+      <p:bldP spid="90" grpId="0" build="p"/>
+    </p:bldLst>
+  </p:timing>
+</p:sld>
+</file>
+
+<file path=ppt/slides/slide27.xml><?xml version="1.0" encoding="utf-8"?>
+<p:sld xmlns:a="http://schemas.openxmlformats.org/drawingml/2006/main" xmlns:r="http://schemas.openxmlformats.org/officeDocument/2006/relationships" xmlns:p="http://schemas.openxmlformats.org/presentationml/2006/main">
+  <p:cSld>
+    <p:spTree>
+      <p:nvGrpSpPr>
+        <p:cNvPr id="1" name="">
+          <a:extLst>
+            <a:ext uri="{FF2B5EF4-FFF2-40B4-BE49-F238E27FC236}">
               <a16:creationId xmlns:a16="http://schemas.microsoft.com/office/drawing/2014/main" id="{51DF3CAA-A0E5-8041-C726-B25757DBE03E}"/>
             </a:ext>
           </a:extLst>
@@ -29225,7 +30165,7 @@
           <a:lstStyle/>
           <a:p>
             <a:fld id="{70068E8A-AB75-4D96-80F4-5032AB30E87C}" type="slidenum">
-              <a:t>26</a:t>
+              <a:t>27</a:t>
             </a:fld>
             <a:endParaRPr/>
           </a:p>
@@ -29750,7 +30690,7 @@
 </p:sld>
 </file>
 
-<file path=ppt/slides/slide27.xml><?xml version="1.0" encoding="utf-8"?>
+<file path=ppt/slides/slide28.xml><?xml version="1.0" encoding="utf-8"?>
 <p:sld xmlns:a="http://schemas.openxmlformats.org/drawingml/2006/main" xmlns:r="http://schemas.openxmlformats.org/officeDocument/2006/relationships" xmlns:p="http://schemas.openxmlformats.org/presentationml/2006/main">
   <p:cSld>
     <p:spTree>
@@ -30043,7 +30983,7 @@
           <a:lstStyle/>
           <a:p>
             <a:fld id="{66355934-2A0D-40CE-AF77-8E0B7B5FD075}" type="slidenum">
-              <a:t>27</a:t>
+              <a:t>28</a:t>
             </a:fld>
             <a:endParaRPr/>
           </a:p>
@@ -30065,7 +31005,7 @@
 </p:sld>
 </file>
 
-<file path=ppt/slides/slide28.xml><?xml version="1.0" encoding="utf-8"?>
+<file path=ppt/slides/slide29.xml><?xml version="1.0" encoding="utf-8"?>
 <p:sld xmlns:a="http://schemas.openxmlformats.org/drawingml/2006/main" xmlns:r="http://schemas.openxmlformats.org/officeDocument/2006/relationships" xmlns:p="http://schemas.openxmlformats.org/presentationml/2006/main">
   <p:cSld>
     <p:spTree>
@@ -30772,7 +31712,7 @@
           <a:lstStyle/>
           <a:p>
             <a:fld id="{2BF3A098-434A-463C-8190-2D4D4344CD67}" type="slidenum">
-              <a:t>28</a:t>
+              <a:t>29</a:t>
             </a:fld>
             <a:endParaRPr/>
           </a:p>
@@ -31493,7 +32433,497 @@
 </p:sld>
 </file>
 
-<file path=ppt/slides/slide29.xml><?xml version="1.0" encoding="utf-8"?>
+<file path=ppt/slides/slide3.xml><?xml version="1.0" encoding="utf-8"?>
+<p:sld xmlns:a="http://schemas.openxmlformats.org/drawingml/2006/main" xmlns:r="http://schemas.openxmlformats.org/officeDocument/2006/relationships" xmlns:p="http://schemas.openxmlformats.org/presentationml/2006/main">
+  <p:cSld>
+    <p:spTree>
+      <p:nvGrpSpPr>
+        <p:cNvPr id="1" name=""/>
+        <p:cNvGrpSpPr/>
+        <p:nvPr/>
+      </p:nvGrpSpPr>
+      <p:grpSpPr>
+        <a:xfrm>
+          <a:off x="0" y="0"/>
+          <a:ext cx="0" cy="0"/>
+          <a:chOff x="0" y="0"/>
+          <a:chExt cx="0" cy="0"/>
+        </a:xfrm>
+      </p:grpSpPr>
+      <p:sp>
+        <p:nvSpPr>
+          <p:cNvPr id="91" name="PlaceHolder 1"/>
+          <p:cNvSpPr>
+            <a:spLocks noGrp="1"/>
+          </p:cNvSpPr>
+          <p:nvPr>
+            <p:ph type="title"/>
+          </p:nvPr>
+        </p:nvSpPr>
+        <p:spPr>
+          <a:xfrm>
+            <a:off x="684000" y="584640"/>
+            <a:ext cx="5478840" cy="558000"/>
+          </a:xfrm>
+          <a:prstGeom prst="rect">
+            <a:avLst/>
+          </a:prstGeom>
+          <a:noFill/>
+          <a:ln w="0">
+            <a:noFill/>
+          </a:ln>
+        </p:spPr>
+        <p:txBody>
+          <a:bodyPr lIns="0" tIns="0" rIns="0" bIns="0" anchor="t">
+            <a:noAutofit/>
+          </a:bodyPr>
+          <a:lstStyle/>
+          <a:p>
+            <a:pPr>
+              <a:lnSpc>
+                <a:spcPct val="100000"/>
+              </a:lnSpc>
+              <a:buNone/>
+            </a:pPr>
+            <a:r>
+              <a:rPr lang="de-DE" sz="3000" b="1" strike="noStrike" spc="-1">
+                <a:solidFill>
+                  <a:srgbClr val="003056"/>
+                </a:solidFill>
+                <a:latin typeface="Calibri"/>
+              </a:rPr>
+              <a:t>Outline</a:t>
+            </a:r>
+            <a:endParaRPr lang="de-DE" sz="3000" b="0" strike="noStrike" spc="-1">
+              <a:solidFill>
+                <a:srgbClr val="000000"/>
+              </a:solidFill>
+              <a:latin typeface="Calibri"/>
+            </a:endParaRPr>
+          </a:p>
+        </p:txBody>
+      </p:sp>
+      <p:sp>
+        <p:nvSpPr>
+          <p:cNvPr id="92" name="PlaceHolder 2"/>
+          <p:cNvSpPr>
+            <a:spLocks noGrp="1"/>
+          </p:cNvSpPr>
+          <p:nvPr>
+            <p:ph type="ftr" idx="9"/>
+          </p:nvPr>
+        </p:nvSpPr>
+        <p:spPr>
+          <a:xfrm>
+            <a:off x="684000" y="6134400"/>
+            <a:ext cx="2895120" cy="179640"/>
+          </a:xfrm>
+          <a:prstGeom prst="rect">
+            <a:avLst/>
+          </a:prstGeom>
+          <a:noFill/>
+          <a:ln w="0">
+            <a:noFill/>
+          </a:ln>
+        </p:spPr>
+        <p:txBody>
+          <a:bodyPr lIns="0" tIns="0" rIns="0" bIns="0" anchor="t">
+            <a:noAutofit/>
+          </a:bodyPr>
+          <a:lstStyle>
+            <a:lvl1pPr>
+              <a:lnSpc>
+                <a:spcPct val="100000"/>
+              </a:lnSpc>
+              <a:buNone/>
+              <a:defRPr lang="de-DE" sz="1200" b="0" strike="noStrike" spc="-1">
+                <a:solidFill>
+                  <a:srgbClr val="003056"/>
+                </a:solidFill>
+                <a:latin typeface="Calibri"/>
+              </a:defRPr>
+            </a:lvl1pPr>
+          </a:lstStyle>
+          <a:p>
+            <a:pPr>
+              <a:lnSpc>
+                <a:spcPct val="100000"/>
+              </a:lnSpc>
+              <a:buNone/>
+            </a:pPr>
+            <a:r>
+              <a:rPr lang="de-DE" sz="1200" b="0" strike="noStrike" spc="-1">
+                <a:solidFill>
+                  <a:srgbClr val="003056"/>
+                </a:solidFill>
+                <a:latin typeface="Calibri"/>
+              </a:rPr>
+              <a:t>Dr. Daniel Ruffinelli - FSS 2025</a:t>
+            </a:r>
+            <a:endParaRPr lang="en-US" sz="1200" b="0" strike="noStrike" spc="-1">
+              <a:latin typeface="Times New Roman"/>
+            </a:endParaRPr>
+          </a:p>
+        </p:txBody>
+      </p:sp>
+      <p:sp>
+        <p:nvSpPr>
+          <p:cNvPr id="93" name="PlaceHolder 3"/>
+          <p:cNvSpPr>
+            <a:spLocks noGrp="1"/>
+          </p:cNvSpPr>
+          <p:nvPr>
+            <p:ph/>
+          </p:nvPr>
+        </p:nvSpPr>
+        <p:spPr>
+          <a:xfrm>
+            <a:off x="684000" y="1143000"/>
+            <a:ext cx="7775640" cy="4673160"/>
+          </a:xfrm>
+          <a:prstGeom prst="rect">
+            <a:avLst/>
+          </a:prstGeom>
+          <a:noFill/>
+          <a:ln w="0">
+            <a:noFill/>
+          </a:ln>
+        </p:spPr>
+        <p:txBody>
+          <a:bodyPr lIns="0" tIns="0" rIns="0" bIns="0" anchor="t">
+            <a:noAutofit/>
+          </a:bodyPr>
+          <a:lstStyle/>
+          <a:p>
+            <a:pPr marL="342900" indent="-342900">
+              <a:lnSpc>
+                <a:spcPct val="100000"/>
+              </a:lnSpc>
+              <a:spcBef>
+                <a:spcPts val="360"/>
+              </a:spcBef>
+              <a:buNone/>
+              <a:tabLst>
+                <a:tab pos="0" algn="l"/>
+              </a:tabLst>
+            </a:pPr>
+            <a:endParaRPr lang="de-DE" sz="1800" b="0" strike="noStrike" spc="-1">
+              <a:solidFill>
+                <a:srgbClr val="003056"/>
+              </a:solidFill>
+              <a:latin typeface="Calibri"/>
+            </a:endParaRPr>
+          </a:p>
+          <a:p>
+            <a:pPr>
+              <a:lnSpc>
+                <a:spcPct val="100000"/>
+              </a:lnSpc>
+              <a:spcBef>
+                <a:spcPts val="400"/>
+              </a:spcBef>
+              <a:buNone/>
+              <a:tabLst>
+                <a:tab pos="0" algn="l"/>
+              </a:tabLst>
+            </a:pPr>
+            <a:endParaRPr lang="de-DE" sz="2000" b="0" strike="noStrike" spc="-1">
+              <a:solidFill>
+                <a:srgbClr val="003056"/>
+              </a:solidFill>
+              <a:latin typeface="Calibri"/>
+            </a:endParaRPr>
+          </a:p>
+          <a:p>
+            <a:pPr>
+              <a:lnSpc>
+                <a:spcPct val="100000"/>
+              </a:lnSpc>
+              <a:spcBef>
+                <a:spcPts val="400"/>
+              </a:spcBef>
+              <a:buNone/>
+              <a:tabLst>
+                <a:tab pos="0" algn="l"/>
+              </a:tabLst>
+            </a:pPr>
+            <a:endParaRPr lang="de-DE" sz="2000" b="0" strike="noStrike" spc="-1">
+              <a:solidFill>
+                <a:srgbClr val="003056"/>
+              </a:solidFill>
+              <a:latin typeface="Calibri"/>
+            </a:endParaRPr>
+          </a:p>
+          <a:p>
+            <a:pPr marL="342900" indent="-342900">
+              <a:lnSpc>
+                <a:spcPct val="100000"/>
+              </a:lnSpc>
+              <a:spcBef>
+                <a:spcPts val="400"/>
+              </a:spcBef>
+              <a:buClr>
+                <a:srgbClr val="003056"/>
+              </a:buClr>
+              <a:buFont typeface="Calibri"/>
+              <a:buAutoNum type="arabicPeriod"/>
+              <a:tabLst>
+                <a:tab pos="0" algn="l"/>
+              </a:tabLst>
+            </a:pPr>
+            <a:endParaRPr lang="en-US" sz="2000" spc="-1">
+              <a:solidFill>
+                <a:srgbClr val="003056"/>
+              </a:solidFill>
+              <a:latin typeface="Calibri"/>
+            </a:endParaRPr>
+          </a:p>
+          <a:p>
+            <a:pPr marL="342900" indent="-342900">
+              <a:lnSpc>
+                <a:spcPct val="100000"/>
+              </a:lnSpc>
+              <a:spcBef>
+                <a:spcPts val="400"/>
+              </a:spcBef>
+              <a:buClr>
+                <a:srgbClr val="003056"/>
+              </a:buClr>
+              <a:buAutoNum type="arabicPeriod"/>
+              <a:tabLst>
+                <a:tab pos="0" algn="l"/>
+              </a:tabLst>
+            </a:pPr>
+            <a:r>
+              <a:rPr lang="en-US" sz="2000" spc="-1">
+                <a:solidFill>
+                  <a:srgbClr val="003056"/>
+                </a:solidFill>
+                <a:latin typeface="Calibri"/>
+              </a:rPr>
+              <a:t>LLM Evaluation</a:t>
+            </a:r>
+            <a:endParaRPr lang="de-DE" sz="2000" b="0" strike="noStrike" spc="-1">
+              <a:solidFill>
+                <a:srgbClr val="003056"/>
+              </a:solidFill>
+              <a:latin typeface="Calibri"/>
+            </a:endParaRPr>
+          </a:p>
+          <a:p>
+            <a:pPr marL="342900" indent="-342900">
+              <a:lnSpc>
+                <a:spcPct val="100000"/>
+              </a:lnSpc>
+              <a:spcBef>
+                <a:spcPts val="400"/>
+              </a:spcBef>
+              <a:buClr>
+                <a:srgbClr val="003056"/>
+              </a:buClr>
+              <a:buAutoNum type="arabicPeriod"/>
+              <a:tabLst>
+                <a:tab pos="0" algn="l"/>
+              </a:tabLst>
+            </a:pPr>
+            <a:endParaRPr lang="en-US" sz="2000" spc="-1">
+              <a:solidFill>
+                <a:srgbClr val="003056"/>
+              </a:solidFill>
+              <a:latin typeface="Calibri"/>
+            </a:endParaRPr>
+          </a:p>
+          <a:p>
+            <a:pPr marL="342900" indent="-342900">
+              <a:lnSpc>
+                <a:spcPct val="100000"/>
+              </a:lnSpc>
+              <a:spcBef>
+                <a:spcPts val="400"/>
+              </a:spcBef>
+              <a:buClr>
+                <a:srgbClr val="003056"/>
+              </a:buClr>
+              <a:buAutoNum type="arabicPeriod"/>
+              <a:tabLst>
+                <a:tab pos="0" algn="l"/>
+              </a:tabLst>
+            </a:pPr>
+            <a:endParaRPr lang="en-US" sz="2000" spc="-1">
+              <a:solidFill>
+                <a:srgbClr val="003056"/>
+              </a:solidFill>
+              <a:latin typeface="Calibri"/>
+            </a:endParaRPr>
+          </a:p>
+          <a:p>
+            <a:pPr marL="342900" indent="-342900">
+              <a:lnSpc>
+                <a:spcPct val="100000"/>
+              </a:lnSpc>
+              <a:spcBef>
+                <a:spcPts val="400"/>
+              </a:spcBef>
+              <a:buClr>
+                <a:srgbClr val="003056"/>
+              </a:buClr>
+              <a:buAutoNum type="arabicPeriod"/>
+              <a:tabLst>
+                <a:tab pos="0" algn="l"/>
+              </a:tabLst>
+            </a:pPr>
+            <a:r>
+              <a:rPr lang="en-US" sz="2000" spc="-1">
+                <a:solidFill>
+                  <a:srgbClr val="003056"/>
+                </a:solidFill>
+                <a:latin typeface="Calibri"/>
+              </a:rPr>
+              <a:t>Real-World Applications</a:t>
+            </a:r>
+            <a:endParaRPr lang="en-US" sz="2000" b="0" strike="noStrike" spc="-1">
+              <a:solidFill>
+                <a:srgbClr val="003056"/>
+              </a:solidFill>
+              <a:latin typeface="Calibri"/>
+            </a:endParaRPr>
+          </a:p>
+          <a:p>
+            <a:pPr>
+              <a:lnSpc>
+                <a:spcPct val="100000"/>
+              </a:lnSpc>
+              <a:spcBef>
+                <a:spcPts val="400"/>
+              </a:spcBef>
+              <a:buNone/>
+              <a:tabLst>
+                <a:tab pos="0" algn="l"/>
+              </a:tabLst>
+            </a:pPr>
+            <a:endParaRPr lang="de-DE" sz="2000" b="0" strike="noStrike" spc="-1">
+              <a:solidFill>
+                <a:srgbClr val="003056"/>
+              </a:solidFill>
+              <a:latin typeface="Calibri"/>
+            </a:endParaRPr>
+          </a:p>
+          <a:p>
+            <a:pPr marL="342900" indent="-342900">
+              <a:lnSpc>
+                <a:spcPct val="100000"/>
+              </a:lnSpc>
+              <a:spcBef>
+                <a:spcPts val="400"/>
+              </a:spcBef>
+              <a:buNone/>
+              <a:tabLst>
+                <a:tab pos="0" algn="l"/>
+              </a:tabLst>
+            </a:pPr>
+            <a:endParaRPr lang="de-DE" sz="2000" b="0" strike="noStrike" spc="-1">
+              <a:solidFill>
+                <a:srgbClr val="003056"/>
+              </a:solidFill>
+              <a:latin typeface="Calibri"/>
+            </a:endParaRPr>
+          </a:p>
+          <a:p>
+            <a:pPr>
+              <a:lnSpc>
+                <a:spcPct val="100000"/>
+              </a:lnSpc>
+              <a:spcBef>
+                <a:spcPts val="400"/>
+              </a:spcBef>
+              <a:buNone/>
+              <a:tabLst>
+                <a:tab pos="0" algn="l"/>
+              </a:tabLst>
+            </a:pPr>
+            <a:endParaRPr lang="de-DE" sz="2000" b="0" strike="noStrike" spc="-1">
+              <a:solidFill>
+                <a:srgbClr val="003056"/>
+              </a:solidFill>
+              <a:latin typeface="Calibri"/>
+            </a:endParaRPr>
+          </a:p>
+          <a:p>
+            <a:pPr>
+              <a:lnSpc>
+                <a:spcPct val="100000"/>
+              </a:lnSpc>
+              <a:spcBef>
+                <a:spcPts val="400"/>
+              </a:spcBef>
+              <a:buNone/>
+              <a:tabLst>
+                <a:tab pos="0" algn="l"/>
+              </a:tabLst>
+            </a:pPr>
+            <a:endParaRPr lang="de-DE" sz="2000" b="0" strike="noStrike" spc="-1">
+              <a:solidFill>
+                <a:srgbClr val="003056"/>
+              </a:solidFill>
+              <a:latin typeface="Calibri"/>
+            </a:endParaRPr>
+          </a:p>
+          <a:p>
+            <a:pPr marL="342900" indent="-342900">
+              <a:lnSpc>
+                <a:spcPct val="100000"/>
+              </a:lnSpc>
+              <a:spcBef>
+                <a:spcPts val="360"/>
+              </a:spcBef>
+              <a:buNone/>
+              <a:tabLst>
+                <a:tab pos="0" algn="l"/>
+              </a:tabLst>
+            </a:pPr>
+            <a:endParaRPr lang="de-DE" sz="1800" b="0" strike="noStrike" spc="-1">
+              <a:solidFill>
+                <a:srgbClr val="003056"/>
+              </a:solidFill>
+              <a:latin typeface="Calibri"/>
+            </a:endParaRPr>
+          </a:p>
+        </p:txBody>
+      </p:sp>
+      <p:sp>
+        <p:nvSpPr>
+          <p:cNvPr id="5" name="PlaceHolder 4"/>
+          <p:cNvSpPr>
+            <a:spLocks noGrp="1"/>
+          </p:cNvSpPr>
+          <p:nvPr>
+            <p:ph type="sldNum" idx="6"/>
+          </p:nvPr>
+        </p:nvSpPr>
+        <p:spPr/>
+        <p:txBody>
+          <a:bodyPr/>
+          <a:lstStyle/>
+          <a:p>
+            <a:fld id="{392E7988-7229-4F1A-B3B1-DD653AA384E8}" type="slidenum">
+              <a:t>3</a:t>
+            </a:fld>
+            <a:endParaRPr/>
+          </a:p>
+        </p:txBody>
+      </p:sp>
+    </p:spTree>
+  </p:cSld>
+  <p:clrMapOvr>
+    <a:masterClrMapping/>
+  </p:clrMapOvr>
+  <p:transition>
+    <p:fade/>
+  </p:transition>
+</p:sld>
+</file>
+
+<file path=ppt/slides/slide30.xml><?xml version="1.0" encoding="utf-8"?>
 <p:sld xmlns:a="http://schemas.openxmlformats.org/drawingml/2006/main" xmlns:r="http://schemas.openxmlformats.org/officeDocument/2006/relationships" xmlns:p="http://schemas.openxmlformats.org/presentationml/2006/main">
   <p:cSld>
     <p:spTree>
@@ -32387,7 +33817,7 @@
           <a:lstStyle/>
           <a:p>
             <a:fld id="{FA539DE3-00D9-4291-B6A7-EA3D736CA829}" type="slidenum">
-              <a:t>29</a:t>
+              <a:t>30</a:t>
             </a:fld>
             <a:endParaRPr/>
           </a:p>
@@ -33108,497 +34538,7 @@
 </p:sld>
 </file>
 
-<file path=ppt/slides/slide3.xml><?xml version="1.0" encoding="utf-8"?>
-<p:sld xmlns:a="http://schemas.openxmlformats.org/drawingml/2006/main" xmlns:r="http://schemas.openxmlformats.org/officeDocument/2006/relationships" xmlns:p="http://schemas.openxmlformats.org/presentationml/2006/main">
-  <p:cSld>
-    <p:spTree>
-      <p:nvGrpSpPr>
-        <p:cNvPr id="1" name=""/>
-        <p:cNvGrpSpPr/>
-        <p:nvPr/>
-      </p:nvGrpSpPr>
-      <p:grpSpPr>
-        <a:xfrm>
-          <a:off x="0" y="0"/>
-          <a:ext cx="0" cy="0"/>
-          <a:chOff x="0" y="0"/>
-          <a:chExt cx="0" cy="0"/>
-        </a:xfrm>
-      </p:grpSpPr>
-      <p:sp>
-        <p:nvSpPr>
-          <p:cNvPr id="91" name="PlaceHolder 1"/>
-          <p:cNvSpPr>
-            <a:spLocks noGrp="1"/>
-          </p:cNvSpPr>
-          <p:nvPr>
-            <p:ph type="title"/>
-          </p:nvPr>
-        </p:nvSpPr>
-        <p:spPr>
-          <a:xfrm>
-            <a:off x="684000" y="584640"/>
-            <a:ext cx="5478840" cy="558000"/>
-          </a:xfrm>
-          <a:prstGeom prst="rect">
-            <a:avLst/>
-          </a:prstGeom>
-          <a:noFill/>
-          <a:ln w="0">
-            <a:noFill/>
-          </a:ln>
-        </p:spPr>
-        <p:txBody>
-          <a:bodyPr lIns="0" tIns="0" rIns="0" bIns="0" anchor="t">
-            <a:noAutofit/>
-          </a:bodyPr>
-          <a:lstStyle/>
-          <a:p>
-            <a:pPr>
-              <a:lnSpc>
-                <a:spcPct val="100000"/>
-              </a:lnSpc>
-              <a:buNone/>
-            </a:pPr>
-            <a:r>
-              <a:rPr lang="de-DE" sz="3000" b="1" strike="noStrike" spc="-1">
-                <a:solidFill>
-                  <a:srgbClr val="003056"/>
-                </a:solidFill>
-                <a:latin typeface="Calibri"/>
-              </a:rPr>
-              <a:t>Outline</a:t>
-            </a:r>
-            <a:endParaRPr lang="de-DE" sz="3000" b="0" strike="noStrike" spc="-1">
-              <a:solidFill>
-                <a:srgbClr val="000000"/>
-              </a:solidFill>
-              <a:latin typeface="Calibri"/>
-            </a:endParaRPr>
-          </a:p>
-        </p:txBody>
-      </p:sp>
-      <p:sp>
-        <p:nvSpPr>
-          <p:cNvPr id="92" name="PlaceHolder 2"/>
-          <p:cNvSpPr>
-            <a:spLocks noGrp="1"/>
-          </p:cNvSpPr>
-          <p:nvPr>
-            <p:ph type="ftr" idx="9"/>
-          </p:nvPr>
-        </p:nvSpPr>
-        <p:spPr>
-          <a:xfrm>
-            <a:off x="684000" y="6134400"/>
-            <a:ext cx="2895120" cy="179640"/>
-          </a:xfrm>
-          <a:prstGeom prst="rect">
-            <a:avLst/>
-          </a:prstGeom>
-          <a:noFill/>
-          <a:ln w="0">
-            <a:noFill/>
-          </a:ln>
-        </p:spPr>
-        <p:txBody>
-          <a:bodyPr lIns="0" tIns="0" rIns="0" bIns="0" anchor="t">
-            <a:noAutofit/>
-          </a:bodyPr>
-          <a:lstStyle>
-            <a:lvl1pPr>
-              <a:lnSpc>
-                <a:spcPct val="100000"/>
-              </a:lnSpc>
-              <a:buNone/>
-              <a:defRPr lang="de-DE" sz="1200" b="0" strike="noStrike" spc="-1">
-                <a:solidFill>
-                  <a:srgbClr val="003056"/>
-                </a:solidFill>
-                <a:latin typeface="Calibri"/>
-              </a:defRPr>
-            </a:lvl1pPr>
-          </a:lstStyle>
-          <a:p>
-            <a:pPr>
-              <a:lnSpc>
-                <a:spcPct val="100000"/>
-              </a:lnSpc>
-              <a:buNone/>
-            </a:pPr>
-            <a:r>
-              <a:rPr lang="de-DE" sz="1200" b="0" strike="noStrike" spc="-1">
-                <a:solidFill>
-                  <a:srgbClr val="003056"/>
-                </a:solidFill>
-                <a:latin typeface="Calibri"/>
-              </a:rPr>
-              <a:t>Dr. Daniel Ruffinelli - FSS 2025</a:t>
-            </a:r>
-            <a:endParaRPr lang="en-US" sz="1200" b="0" strike="noStrike" spc="-1">
-              <a:latin typeface="Times New Roman"/>
-            </a:endParaRPr>
-          </a:p>
-        </p:txBody>
-      </p:sp>
-      <p:sp>
-        <p:nvSpPr>
-          <p:cNvPr id="93" name="PlaceHolder 3"/>
-          <p:cNvSpPr>
-            <a:spLocks noGrp="1"/>
-          </p:cNvSpPr>
-          <p:nvPr>
-            <p:ph/>
-          </p:nvPr>
-        </p:nvSpPr>
-        <p:spPr>
-          <a:xfrm>
-            <a:off x="684000" y="1143000"/>
-            <a:ext cx="7775640" cy="4673160"/>
-          </a:xfrm>
-          <a:prstGeom prst="rect">
-            <a:avLst/>
-          </a:prstGeom>
-          <a:noFill/>
-          <a:ln w="0">
-            <a:noFill/>
-          </a:ln>
-        </p:spPr>
-        <p:txBody>
-          <a:bodyPr lIns="0" tIns="0" rIns="0" bIns="0" anchor="t">
-            <a:noAutofit/>
-          </a:bodyPr>
-          <a:lstStyle/>
-          <a:p>
-            <a:pPr marL="342900" indent="-342900">
-              <a:lnSpc>
-                <a:spcPct val="100000"/>
-              </a:lnSpc>
-              <a:spcBef>
-                <a:spcPts val="360"/>
-              </a:spcBef>
-              <a:buNone/>
-              <a:tabLst>
-                <a:tab pos="0" algn="l"/>
-              </a:tabLst>
-            </a:pPr>
-            <a:endParaRPr lang="de-DE" sz="1800" b="0" strike="noStrike" spc="-1">
-              <a:solidFill>
-                <a:srgbClr val="003056"/>
-              </a:solidFill>
-              <a:latin typeface="Calibri"/>
-            </a:endParaRPr>
-          </a:p>
-          <a:p>
-            <a:pPr>
-              <a:lnSpc>
-                <a:spcPct val="100000"/>
-              </a:lnSpc>
-              <a:spcBef>
-                <a:spcPts val="400"/>
-              </a:spcBef>
-              <a:buNone/>
-              <a:tabLst>
-                <a:tab pos="0" algn="l"/>
-              </a:tabLst>
-            </a:pPr>
-            <a:endParaRPr lang="de-DE" sz="2000" b="0" strike="noStrike" spc="-1">
-              <a:solidFill>
-                <a:srgbClr val="003056"/>
-              </a:solidFill>
-              <a:latin typeface="Calibri"/>
-            </a:endParaRPr>
-          </a:p>
-          <a:p>
-            <a:pPr>
-              <a:lnSpc>
-                <a:spcPct val="100000"/>
-              </a:lnSpc>
-              <a:spcBef>
-                <a:spcPts val="400"/>
-              </a:spcBef>
-              <a:buNone/>
-              <a:tabLst>
-                <a:tab pos="0" algn="l"/>
-              </a:tabLst>
-            </a:pPr>
-            <a:endParaRPr lang="de-DE" sz="2000" b="0" strike="noStrike" spc="-1">
-              <a:solidFill>
-                <a:srgbClr val="003056"/>
-              </a:solidFill>
-              <a:latin typeface="Calibri"/>
-            </a:endParaRPr>
-          </a:p>
-          <a:p>
-            <a:pPr marL="342900" indent="-342900">
-              <a:lnSpc>
-                <a:spcPct val="100000"/>
-              </a:lnSpc>
-              <a:spcBef>
-                <a:spcPts val="400"/>
-              </a:spcBef>
-              <a:buClr>
-                <a:srgbClr val="003056"/>
-              </a:buClr>
-              <a:buFont typeface="Calibri"/>
-              <a:buAutoNum type="arabicPeriod"/>
-              <a:tabLst>
-                <a:tab pos="0" algn="l"/>
-              </a:tabLst>
-            </a:pPr>
-            <a:endParaRPr lang="en-US" sz="2000" spc="-1">
-              <a:solidFill>
-                <a:srgbClr val="003056"/>
-              </a:solidFill>
-              <a:latin typeface="Calibri"/>
-            </a:endParaRPr>
-          </a:p>
-          <a:p>
-            <a:pPr marL="342900" indent="-342900">
-              <a:lnSpc>
-                <a:spcPct val="100000"/>
-              </a:lnSpc>
-              <a:spcBef>
-                <a:spcPts val="400"/>
-              </a:spcBef>
-              <a:buClr>
-                <a:srgbClr val="003056"/>
-              </a:buClr>
-              <a:buAutoNum type="arabicPeriod"/>
-              <a:tabLst>
-                <a:tab pos="0" algn="l"/>
-              </a:tabLst>
-            </a:pPr>
-            <a:r>
-              <a:rPr lang="en-US" sz="2000" spc="-1">
-                <a:solidFill>
-                  <a:srgbClr val="003056"/>
-                </a:solidFill>
-                <a:latin typeface="Calibri"/>
-              </a:rPr>
-              <a:t>LLM Evaluation</a:t>
-            </a:r>
-            <a:endParaRPr lang="de-DE" sz="2000" b="0" strike="noStrike" spc="-1">
-              <a:solidFill>
-                <a:srgbClr val="003056"/>
-              </a:solidFill>
-              <a:latin typeface="Calibri"/>
-            </a:endParaRPr>
-          </a:p>
-          <a:p>
-            <a:pPr marL="342900" indent="-342900">
-              <a:lnSpc>
-                <a:spcPct val="100000"/>
-              </a:lnSpc>
-              <a:spcBef>
-                <a:spcPts val="400"/>
-              </a:spcBef>
-              <a:buClr>
-                <a:srgbClr val="003056"/>
-              </a:buClr>
-              <a:buAutoNum type="arabicPeriod"/>
-              <a:tabLst>
-                <a:tab pos="0" algn="l"/>
-              </a:tabLst>
-            </a:pPr>
-            <a:endParaRPr lang="en-US" sz="2000" spc="-1">
-              <a:solidFill>
-                <a:srgbClr val="003056"/>
-              </a:solidFill>
-              <a:latin typeface="Calibri"/>
-            </a:endParaRPr>
-          </a:p>
-          <a:p>
-            <a:pPr marL="342900" indent="-342900">
-              <a:lnSpc>
-                <a:spcPct val="100000"/>
-              </a:lnSpc>
-              <a:spcBef>
-                <a:spcPts val="400"/>
-              </a:spcBef>
-              <a:buClr>
-                <a:srgbClr val="003056"/>
-              </a:buClr>
-              <a:buAutoNum type="arabicPeriod"/>
-              <a:tabLst>
-                <a:tab pos="0" algn="l"/>
-              </a:tabLst>
-            </a:pPr>
-            <a:endParaRPr lang="en-US" sz="2000" spc="-1">
-              <a:solidFill>
-                <a:srgbClr val="003056"/>
-              </a:solidFill>
-              <a:latin typeface="Calibri"/>
-            </a:endParaRPr>
-          </a:p>
-          <a:p>
-            <a:pPr marL="342900" indent="-342900">
-              <a:lnSpc>
-                <a:spcPct val="100000"/>
-              </a:lnSpc>
-              <a:spcBef>
-                <a:spcPts val="400"/>
-              </a:spcBef>
-              <a:buClr>
-                <a:srgbClr val="003056"/>
-              </a:buClr>
-              <a:buAutoNum type="arabicPeriod"/>
-              <a:tabLst>
-                <a:tab pos="0" algn="l"/>
-              </a:tabLst>
-            </a:pPr>
-            <a:r>
-              <a:rPr lang="en-US" sz="2000" spc="-1">
-                <a:solidFill>
-                  <a:srgbClr val="003056"/>
-                </a:solidFill>
-                <a:latin typeface="Calibri"/>
-              </a:rPr>
-              <a:t>Real-World Applications</a:t>
-            </a:r>
-            <a:endParaRPr lang="en-US" sz="2000" b="0" strike="noStrike" spc="-1">
-              <a:solidFill>
-                <a:srgbClr val="003056"/>
-              </a:solidFill>
-              <a:latin typeface="Calibri"/>
-            </a:endParaRPr>
-          </a:p>
-          <a:p>
-            <a:pPr>
-              <a:lnSpc>
-                <a:spcPct val="100000"/>
-              </a:lnSpc>
-              <a:spcBef>
-                <a:spcPts val="400"/>
-              </a:spcBef>
-              <a:buNone/>
-              <a:tabLst>
-                <a:tab pos="0" algn="l"/>
-              </a:tabLst>
-            </a:pPr>
-            <a:endParaRPr lang="de-DE" sz="2000" b="0" strike="noStrike" spc="-1">
-              <a:solidFill>
-                <a:srgbClr val="003056"/>
-              </a:solidFill>
-              <a:latin typeface="Calibri"/>
-            </a:endParaRPr>
-          </a:p>
-          <a:p>
-            <a:pPr marL="342900" indent="-342900">
-              <a:lnSpc>
-                <a:spcPct val="100000"/>
-              </a:lnSpc>
-              <a:spcBef>
-                <a:spcPts val="400"/>
-              </a:spcBef>
-              <a:buNone/>
-              <a:tabLst>
-                <a:tab pos="0" algn="l"/>
-              </a:tabLst>
-            </a:pPr>
-            <a:endParaRPr lang="de-DE" sz="2000" b="0" strike="noStrike" spc="-1">
-              <a:solidFill>
-                <a:srgbClr val="003056"/>
-              </a:solidFill>
-              <a:latin typeface="Calibri"/>
-            </a:endParaRPr>
-          </a:p>
-          <a:p>
-            <a:pPr>
-              <a:lnSpc>
-                <a:spcPct val="100000"/>
-              </a:lnSpc>
-              <a:spcBef>
-                <a:spcPts val="400"/>
-              </a:spcBef>
-              <a:buNone/>
-              <a:tabLst>
-                <a:tab pos="0" algn="l"/>
-              </a:tabLst>
-            </a:pPr>
-            <a:endParaRPr lang="de-DE" sz="2000" b="0" strike="noStrike" spc="-1">
-              <a:solidFill>
-                <a:srgbClr val="003056"/>
-              </a:solidFill>
-              <a:latin typeface="Calibri"/>
-            </a:endParaRPr>
-          </a:p>
-          <a:p>
-            <a:pPr>
-              <a:lnSpc>
-                <a:spcPct val="100000"/>
-              </a:lnSpc>
-              <a:spcBef>
-                <a:spcPts val="400"/>
-              </a:spcBef>
-              <a:buNone/>
-              <a:tabLst>
-                <a:tab pos="0" algn="l"/>
-              </a:tabLst>
-            </a:pPr>
-            <a:endParaRPr lang="de-DE" sz="2000" b="0" strike="noStrike" spc="-1">
-              <a:solidFill>
-                <a:srgbClr val="003056"/>
-              </a:solidFill>
-              <a:latin typeface="Calibri"/>
-            </a:endParaRPr>
-          </a:p>
-          <a:p>
-            <a:pPr marL="342900" indent="-342900">
-              <a:lnSpc>
-                <a:spcPct val="100000"/>
-              </a:lnSpc>
-              <a:spcBef>
-                <a:spcPts val="360"/>
-              </a:spcBef>
-              <a:buNone/>
-              <a:tabLst>
-                <a:tab pos="0" algn="l"/>
-              </a:tabLst>
-            </a:pPr>
-            <a:endParaRPr lang="de-DE" sz="1800" b="0" strike="noStrike" spc="-1">
-              <a:solidFill>
-                <a:srgbClr val="003056"/>
-              </a:solidFill>
-              <a:latin typeface="Calibri"/>
-            </a:endParaRPr>
-          </a:p>
-        </p:txBody>
-      </p:sp>
-      <p:sp>
-        <p:nvSpPr>
-          <p:cNvPr id="5" name="PlaceHolder 4"/>
-          <p:cNvSpPr>
-            <a:spLocks noGrp="1"/>
-          </p:cNvSpPr>
-          <p:nvPr>
-            <p:ph type="sldNum" idx="6"/>
-          </p:nvPr>
-        </p:nvSpPr>
-        <p:spPr/>
-        <p:txBody>
-          <a:bodyPr/>
-          <a:lstStyle/>
-          <a:p>
-            <a:fld id="{392E7988-7229-4F1A-B3B1-DD653AA384E8}" type="slidenum">
-              <a:t>3</a:t>
-            </a:fld>
-            <a:endParaRPr/>
-          </a:p>
-        </p:txBody>
-      </p:sp>
-    </p:spTree>
-  </p:cSld>
-  <p:clrMapOvr>
-    <a:masterClrMapping/>
-  </p:clrMapOvr>
-  <p:transition>
-    <p:fade/>
-  </p:transition>
-</p:sld>
-</file>
-
-<file path=ppt/slides/slide30.xml><?xml version="1.0" encoding="utf-8"?>
+<file path=ppt/slides/slide31.xml><?xml version="1.0" encoding="utf-8"?>
 <p:sld xmlns:a="http://schemas.openxmlformats.org/drawingml/2006/main" xmlns:r="http://schemas.openxmlformats.org/officeDocument/2006/relationships" xmlns:p="http://schemas.openxmlformats.org/presentationml/2006/main">
   <p:cSld>
     <p:spTree>
@@ -33896,7 +34836,7 @@
           <a:lstStyle/>
           <a:p>
             <a:fld id="{46AD3A6F-4CEE-4604-B0FB-4D56B1959546}" type="slidenum">
-              <a:t>30</a:t>
+              <a:t>31</a:t>
             </a:fld>
             <a:endParaRPr/>
           </a:p>
@@ -34082,7 +35022,7 @@
 </p:sld>
 </file>
 
-<file path=ppt/slides/slide31.xml><?xml version="1.0" encoding="utf-8"?>
+<file path=ppt/slides/slide32.xml><?xml version="1.0" encoding="utf-8"?>
 <p:sld xmlns:a="http://schemas.openxmlformats.org/drawingml/2006/main" xmlns:r="http://schemas.openxmlformats.org/officeDocument/2006/relationships" xmlns:p="http://schemas.openxmlformats.org/presentationml/2006/main">
   <p:cSld>
     <p:spTree>
@@ -34566,7 +35506,7 @@
           <a:lstStyle/>
           <a:p>
             <a:fld id="{34016626-E17A-458F-B61C-C83FC3996428}" type="slidenum">
-              <a:t>31</a:t>
+              <a:t>32</a:t>
             </a:fld>
             <a:endParaRPr/>
           </a:p>
@@ -35054,7 +35994,7 @@
 </p:sld>
 </file>
 
-<file path=ppt/slides/slide32.xml><?xml version="1.0" encoding="utf-8"?>
+<file path=ppt/slides/slide33.xml><?xml version="1.0" encoding="utf-8"?>
 <p:sld xmlns:a="http://schemas.openxmlformats.org/drawingml/2006/main" xmlns:r="http://schemas.openxmlformats.org/officeDocument/2006/relationships" xmlns:p="http://schemas.openxmlformats.org/presentationml/2006/main">
   <p:cSld>
     <p:spTree>
@@ -35677,7 +36617,7 @@
           <a:lstStyle/>
           <a:p>
             <a:fld id="{14786AF0-D63F-4034-88C5-3EE8EA9854A5}" type="slidenum">
-              <a:t>32</a:t>
+              <a:t>33</a:t>
             </a:fld>
             <a:endParaRPr/>
           </a:p>
@@ -36355,7 +37295,7 @@
 </p:sld>
 </file>
 
-<file path=ppt/slides/slide33.xml><?xml version="1.0" encoding="utf-8"?>
+<file path=ppt/slides/slide34.xml><?xml version="1.0" encoding="utf-8"?>
 <p:sld xmlns:a="http://schemas.openxmlformats.org/drawingml/2006/main" xmlns:r="http://schemas.openxmlformats.org/officeDocument/2006/relationships" xmlns:p="http://schemas.openxmlformats.org/presentationml/2006/main">
   <p:cSld>
     <p:spTree>
@@ -36965,7 +37905,7 @@
           <a:lstStyle/>
           <a:p>
             <a:fld id="{9B17C857-80D5-448B-99E6-4A7162F4B003}" type="slidenum">
-              <a:t>33</a:t>
+              <a:t>34</a:t>
             </a:fld>
             <a:endParaRPr/>
           </a:p>
@@ -37557,7 +38497,7 @@
 </p:sld>
 </file>
 
-<file path=ppt/slides/slide34.xml><?xml version="1.0" encoding="utf-8"?>
+<file path=ppt/slides/slide35.xml><?xml version="1.0" encoding="utf-8"?>
 <p:sld xmlns:a="http://schemas.openxmlformats.org/drawingml/2006/main" xmlns:r="http://schemas.openxmlformats.org/officeDocument/2006/relationships" xmlns:p="http://schemas.openxmlformats.org/presentationml/2006/main">
   <p:cSld>
     <p:spTree>
@@ -38231,7 +39171,7 @@
           <a:lstStyle/>
           <a:p>
             <a:fld id="{DE800624-0915-41AF-AA2E-79E7DE02A88B}" type="slidenum">
-              <a:t>34</a:t>
+              <a:t>35</a:t>
             </a:fld>
             <a:endParaRPr/>
           </a:p>
@@ -38866,7 +39806,7 @@
 </p:sld>
 </file>
 
-<file path=ppt/slides/slide35.xml><?xml version="1.0" encoding="utf-8"?>
+<file path=ppt/slides/slide36.xml><?xml version="1.0" encoding="utf-8"?>
 <p:sld xmlns:a="http://schemas.openxmlformats.org/drawingml/2006/main" xmlns:r="http://schemas.openxmlformats.org/officeDocument/2006/relationships" xmlns:p="http://schemas.openxmlformats.org/presentationml/2006/main">
   <p:cSld>
     <p:spTree>
@@ -39372,7 +40312,7 @@
           <a:lstStyle/>
           <a:p>
             <a:fld id="{91FEB348-7AA1-4B79-B7B0-2216FC5464CE}" type="slidenum">
-              <a:t>35</a:t>
+              <a:t>36</a:t>
             </a:fld>
             <a:endParaRPr/>
           </a:p>
@@ -39921,7 +40861,7 @@
 </p:sld>
 </file>
 
-<file path=ppt/slides/slide36.xml><?xml version="1.0" encoding="utf-8"?>
+<file path=ppt/slides/slide37.xml><?xml version="1.0" encoding="utf-8"?>
 <p:sld xmlns:a="http://schemas.openxmlformats.org/drawingml/2006/main" xmlns:r="http://schemas.openxmlformats.org/officeDocument/2006/relationships" xmlns:p="http://schemas.openxmlformats.org/presentationml/2006/main">
   <p:cSld>
     <p:spTree>
@@ -40386,7 +41326,7 @@
           <a:lstStyle/>
           <a:p>
             <a:fld id="{91FEB348-7AA1-4B79-B7B0-2216FC5464CE}" type="slidenum">
-              <a:t>36</a:t>
+              <a:t>37</a:t>
             </a:fld>
             <a:endParaRPr/>
           </a:p>
@@ -40987,7 +41927,7 @@
 </p:sld>
 </file>
 
-<file path=ppt/slides/slide37.xml><?xml version="1.0" encoding="utf-8"?>
+<file path=ppt/slides/slide38.xml><?xml version="1.0" encoding="utf-8"?>
 <p:sld xmlns:a="http://schemas.openxmlformats.org/drawingml/2006/main" xmlns:r="http://schemas.openxmlformats.org/officeDocument/2006/relationships" xmlns:p="http://schemas.openxmlformats.org/presentationml/2006/main">
   <p:cSld>
     <p:spTree>
@@ -41339,7 +42279,7 @@
           <a:lstStyle/>
           <a:p>
             <a:fld id="{D7D009D0-8826-4C03-AAF0-59E703511C5A}" type="slidenum">
-              <a:t>37</a:t>
+              <a:t>38</a:t>
             </a:fld>
             <a:endParaRPr/>
           </a:p>

</xml_diff>

<commit_message>
fixed bug in slide 12 of nlp applications lecture
</commit_message>
<xml_diff>
--- a/lectures/08_nlp_applications/08_nlp_applications.pptx
+++ b/lectures/08_nlp_applications/08_nlp_applications.pptx
@@ -148,7 +148,7 @@
 <file path=ppt/revisionInfo.xml><?xml version="1.0" encoding="utf-8"?>
 <p1510:revInfo xmlns:a="http://schemas.openxmlformats.org/drawingml/2006/main" xmlns:r="http://schemas.openxmlformats.org/officeDocument/2006/relationships" xmlns:p1510="http://schemas.microsoft.com/office/powerpoint/2015/10/main">
   <p1510:revLst>
-    <p1510:client id="{A31D3485-E714-6DD9-D933-F6116039F444}" v="19" dt="2025-05-23T15:40:48.770"/>
+    <p1510:client id="{B7BD1DEC-658E-9A05-4664-D1209C8783AF}" v="2" dt="2025-05-30T12:11:02.267"/>
   </p1510:revLst>
 </p1510:revInfo>
 </file>
@@ -10377,7 +10377,7 @@
               <a:t>n</a:t>
             </a:r>
             <a:r>
-              <a:rPr lang="en-US" sz="800" i="1" spc="-1" baseline="30000">
+              <a:rPr lang="en-US" sz="800" i="1" spc="-1" baseline="30000" dirty="0">
                 <a:solidFill>
                   <a:srgbClr val="003056"/>
                 </a:solidFill>
@@ -10492,7 +10492,7 @@
               <a:t>n</a:t>
             </a:r>
             <a:r>
-              <a:rPr lang="en-US" sz="900" i="1" spc="-1" baseline="30000">
+              <a:rPr lang="en-US" sz="900" i="1" spc="-1" baseline="30000" dirty="0">
                 <a:solidFill>
                   <a:srgbClr val="003056"/>
                 </a:solidFill>
@@ -10503,7 +10503,7 @@
               <a:t> </a:t>
             </a:r>
             <a:r>
-              <a:rPr lang="en-US" sz="600" i="1" spc="-1" baseline="30000">
+              <a:rPr lang="en-US" sz="600" i="1" spc="-1" baseline="30000" dirty="0">
                 <a:solidFill>
                   <a:srgbClr val="003056"/>
                 </a:solidFill>
@@ -10653,7 +10653,7 @@
                 <a:latin typeface="Calibri"/>
                 <a:cs typeface="Arial"/>
               </a:rPr>
-              <a:t>Recall decoding with BPE-style tokenizers:</a:t>
+              <a:t>Recall encoding with BPE-style tokenizers:</a:t>
             </a:r>
             <a:r>
               <a:rPr lang="en-US" sz="1800" spc="-1">
@@ -10812,7 +10812,7 @@
               <a:t>We </a:t>
             </a:r>
             <a:r>
-              <a:rPr lang="en-US" sz="1800" spc="-1">
+              <a:rPr lang="en-US" sz="1800" spc="-1" dirty="0">
                 <a:solidFill>
                   <a:srgbClr val="003056"/>
                 </a:solidFill>

</xml_diff>